<commit_message>
pic update (Cmd 76)
</commit_message>
<xml_diff>
--- a/IE_BigData_FischerNovotnySchieferdecker_19_01_12.pptx
+++ b/IE_BigData_FischerNovotnySchieferdecker_19_01_12.pptx
@@ -115,7 +115,7 @@
   </p:defaultTextStyle>
   <p:extLst>
     <p:ext uri="{EFAFB233-063F-42B5-8137-9DF3F51BA10A}">
-      <p15:sldGuideLst xmlns:p15="http://schemas.microsoft.com/office/powerpoint/2012/main" xmlns="">
+      <p15:sldGuideLst xmlns="" xmlns:p15="http://schemas.microsoft.com/office/powerpoint/2012/main">
         <p15:guide id="1" orient="horz" pos="2160">
           <p15:clr>
             <a:srgbClr val="A4A3A4"/>
@@ -5747,14 +5747,14 @@
       </p:sp>
       <p:pic>
         <p:nvPicPr>
-          <p:cNvPr id="3" name="Picture 2" descr="T-NO_2-PM_10_Vgl.png"/>
+          <p:cNvPr id="3" name="Picture 2"/>
           <p:cNvPicPr>
             <a:picLocks noChangeAspect="1"/>
           </p:cNvPicPr>
           <p:nvPr/>
         </p:nvPicPr>
         <p:blipFill>
-          <a:blip r:embed="rId2">
+          <a:blip r:embed="rId2" cstate="print">
             <a:extLst>
               <a:ext uri="{28A0092B-C50C-407E-A947-70E740481C1C}">
                 <a14:useLocalDpi xmlns:a14="http://schemas.microsoft.com/office/drawing/2010/main" val="0"/>
@@ -5767,8 +5767,8 @@
         </p:blipFill>
         <p:spPr>
           <a:xfrm>
-            <a:off x="152400" y="1524000"/>
-            <a:ext cx="4267200" cy="3200400"/>
+            <a:off x="-152400" y="1524000"/>
+            <a:ext cx="4572000" cy="4572000"/>
           </a:xfrm>
           <a:prstGeom prst="rect">
             <a:avLst/>
@@ -5797,8 +5797,8 @@
         </p:blipFill>
         <p:spPr>
           <a:xfrm>
-            <a:off x="4572000" y="1143000"/>
-            <a:ext cx="4572000" cy="4572000"/>
+            <a:off x="4343400" y="1143000"/>
+            <a:ext cx="4800600" cy="4800600"/>
           </a:xfrm>
           <a:prstGeom prst="rect">
             <a:avLst/>
@@ -5906,7 +5906,7 @@
           <p:cNvPr id="7" name="Grafik 6">
             <a:extLst>
               <a:ext uri="{FF2B5EF4-FFF2-40B4-BE49-F238E27FC236}">
-                <a16:creationId xmlns:a16="http://schemas.microsoft.com/office/drawing/2014/main" xmlns="" id="{C8A61A4E-0E5C-4196-8EDF-E95BD1356542}"/>
+                <a16:creationId xmlns="" xmlns:a16="http://schemas.microsoft.com/office/drawing/2014/main" id="{C8A61A4E-0E5C-4196-8EDF-E95BD1356542}"/>
               </a:ext>
             </a:extLst>
           </p:cNvPr>
@@ -5936,7 +5936,7 @@
           <p:cNvPr id="8" name="Grafik 7">
             <a:extLst>
               <a:ext uri="{FF2B5EF4-FFF2-40B4-BE49-F238E27FC236}">
-                <a16:creationId xmlns:a16="http://schemas.microsoft.com/office/drawing/2014/main" xmlns="" id="{7F0A1CA0-2059-4CAF-B550-024BE6931780}"/>
+                <a16:creationId xmlns="" xmlns:a16="http://schemas.microsoft.com/office/drawing/2014/main" id="{7F0A1CA0-2059-4CAF-B550-024BE6931780}"/>
               </a:ext>
             </a:extLst>
           </p:cNvPr>
@@ -6059,7 +6059,7 @@
           <p:cNvPr id="4" name="Tabelle 3">
             <a:extLst>
               <a:ext uri="{FF2B5EF4-FFF2-40B4-BE49-F238E27FC236}">
-                <a16:creationId xmlns:a16="http://schemas.microsoft.com/office/drawing/2014/main" xmlns="" id="{18A39996-935A-4DE5-A13E-5216B750A695}"/>
+                <a16:creationId xmlns="" xmlns:a16="http://schemas.microsoft.com/office/drawing/2014/main" id="{18A39996-935A-4DE5-A13E-5216B750A695}"/>
               </a:ext>
             </a:extLst>
           </p:cNvPr>
@@ -6088,28 +6088,28 @@
                 <a:gridCol w="1524000">
                   <a:extLst>
                     <a:ext uri="{9D8B030D-6E8A-4147-A177-3AD203B41FA5}">
-                      <a16:colId xmlns:a16="http://schemas.microsoft.com/office/drawing/2014/main" xmlns="" val="2525907836"/>
+                      <a16:colId xmlns="" xmlns:a16="http://schemas.microsoft.com/office/drawing/2014/main" val="2525907836"/>
                     </a:ext>
                   </a:extLst>
                 </a:gridCol>
                 <a:gridCol w="280359">
                   <a:extLst>
                     <a:ext uri="{9D8B030D-6E8A-4147-A177-3AD203B41FA5}">
-                      <a16:colId xmlns:a16="http://schemas.microsoft.com/office/drawing/2014/main" xmlns="" val="2514151212"/>
+                      <a16:colId xmlns="" xmlns:a16="http://schemas.microsoft.com/office/drawing/2014/main" val="2514151212"/>
                     </a:ext>
                   </a:extLst>
                 </a:gridCol>
                 <a:gridCol w="253041">
                   <a:extLst>
                     <a:ext uri="{9D8B030D-6E8A-4147-A177-3AD203B41FA5}">
-                      <a16:colId xmlns:a16="http://schemas.microsoft.com/office/drawing/2014/main" xmlns="" val="1589343083"/>
+                      <a16:colId xmlns="" xmlns:a16="http://schemas.microsoft.com/office/drawing/2014/main" val="1589343083"/>
                     </a:ext>
                   </a:extLst>
                 </a:gridCol>
                 <a:gridCol w="260498">
                   <a:extLst>
                     <a:ext uri="{9D8B030D-6E8A-4147-A177-3AD203B41FA5}">
-                      <a16:colId xmlns:a16="http://schemas.microsoft.com/office/drawing/2014/main" xmlns="" val="1706187678"/>
+                      <a16:colId xmlns="" xmlns:a16="http://schemas.microsoft.com/office/drawing/2014/main" val="1706187678"/>
                     </a:ext>
                   </a:extLst>
                 </a:gridCol>
@@ -6308,7 +6308,7 @@
                 </a:tc>
                 <a:extLst>
                   <a:ext uri="{0D108BD9-81ED-4DB2-BD59-A6C34878D82A}">
-                    <a16:rowId xmlns:a16="http://schemas.microsoft.com/office/drawing/2014/main" xmlns="" val="4108082978"/>
+                    <a16:rowId xmlns="" xmlns:a16="http://schemas.microsoft.com/office/drawing/2014/main" val="4108082978"/>
                   </a:ext>
                 </a:extLst>
               </a:tr>
@@ -6524,7 +6524,7 @@
                 </a:tc>
                 <a:extLst>
                   <a:ext uri="{0D108BD9-81ED-4DB2-BD59-A6C34878D82A}">
-                    <a16:rowId xmlns:a16="http://schemas.microsoft.com/office/drawing/2014/main" xmlns="" val="3212939625"/>
+                    <a16:rowId xmlns="" xmlns:a16="http://schemas.microsoft.com/office/drawing/2014/main" val="3212939625"/>
                   </a:ext>
                 </a:extLst>
               </a:tr>
@@ -6722,7 +6722,7 @@
                 </a:tc>
                 <a:extLst>
                   <a:ext uri="{0D108BD9-81ED-4DB2-BD59-A6C34878D82A}">
-                    <a16:rowId xmlns:a16="http://schemas.microsoft.com/office/drawing/2014/main" xmlns="" val="3823890681"/>
+                    <a16:rowId xmlns="" xmlns:a16="http://schemas.microsoft.com/office/drawing/2014/main" val="3823890681"/>
                   </a:ext>
                 </a:extLst>
               </a:tr>
@@ -6735,7 +6735,7 @@
           <p:cNvPr id="6" name="Tabelle 5">
             <a:extLst>
               <a:ext uri="{FF2B5EF4-FFF2-40B4-BE49-F238E27FC236}">
-                <a16:creationId xmlns:a16="http://schemas.microsoft.com/office/drawing/2014/main" xmlns="" id="{EE044DA5-07E3-4ECB-980E-2BFFC40603BD}"/>
+                <a16:creationId xmlns="" xmlns:a16="http://schemas.microsoft.com/office/drawing/2014/main" id="{EE044DA5-07E3-4ECB-980E-2BFFC40603BD}"/>
               </a:ext>
             </a:extLst>
           </p:cNvPr>
@@ -6764,28 +6764,28 @@
                 <a:gridCol w="1524000">
                   <a:extLst>
                     <a:ext uri="{9D8B030D-6E8A-4147-A177-3AD203B41FA5}">
-                      <a16:colId xmlns:a16="http://schemas.microsoft.com/office/drawing/2014/main" xmlns="" val="2525907836"/>
+                      <a16:colId xmlns="" xmlns:a16="http://schemas.microsoft.com/office/drawing/2014/main" val="2525907836"/>
                     </a:ext>
                   </a:extLst>
                 </a:gridCol>
                 <a:gridCol w="280359">
                   <a:extLst>
                     <a:ext uri="{9D8B030D-6E8A-4147-A177-3AD203B41FA5}">
-                      <a16:colId xmlns:a16="http://schemas.microsoft.com/office/drawing/2014/main" xmlns="" val="2514151212"/>
+                      <a16:colId xmlns="" xmlns:a16="http://schemas.microsoft.com/office/drawing/2014/main" val="2514151212"/>
                     </a:ext>
                   </a:extLst>
                 </a:gridCol>
                 <a:gridCol w="253041">
                   <a:extLst>
                     <a:ext uri="{9D8B030D-6E8A-4147-A177-3AD203B41FA5}">
-                      <a16:colId xmlns:a16="http://schemas.microsoft.com/office/drawing/2014/main" xmlns="" val="1589343083"/>
+                      <a16:colId xmlns="" xmlns:a16="http://schemas.microsoft.com/office/drawing/2014/main" val="1589343083"/>
                     </a:ext>
                   </a:extLst>
                 </a:gridCol>
                 <a:gridCol w="260498">
                   <a:extLst>
                     <a:ext uri="{9D8B030D-6E8A-4147-A177-3AD203B41FA5}">
-                      <a16:colId xmlns:a16="http://schemas.microsoft.com/office/drawing/2014/main" xmlns="" val="1706187678"/>
+                      <a16:colId xmlns="" xmlns:a16="http://schemas.microsoft.com/office/drawing/2014/main" val="1706187678"/>
                     </a:ext>
                   </a:extLst>
                 </a:gridCol>
@@ -6984,7 +6984,7 @@
                 </a:tc>
                 <a:extLst>
                   <a:ext uri="{0D108BD9-81ED-4DB2-BD59-A6C34878D82A}">
-                    <a16:rowId xmlns:a16="http://schemas.microsoft.com/office/drawing/2014/main" xmlns="" val="4108082978"/>
+                    <a16:rowId xmlns="" xmlns:a16="http://schemas.microsoft.com/office/drawing/2014/main" val="4108082978"/>
                   </a:ext>
                 </a:extLst>
               </a:tr>
@@ -7200,7 +7200,7 @@
                 </a:tc>
                 <a:extLst>
                   <a:ext uri="{0D108BD9-81ED-4DB2-BD59-A6C34878D82A}">
-                    <a16:rowId xmlns:a16="http://schemas.microsoft.com/office/drawing/2014/main" xmlns="" val="3212939625"/>
+                    <a16:rowId xmlns="" xmlns:a16="http://schemas.microsoft.com/office/drawing/2014/main" val="3212939625"/>
                   </a:ext>
                 </a:extLst>
               </a:tr>
@@ -7416,7 +7416,7 @@
                 </a:tc>
                 <a:extLst>
                   <a:ext uri="{0D108BD9-81ED-4DB2-BD59-A6C34878D82A}">
-                    <a16:rowId xmlns:a16="http://schemas.microsoft.com/office/drawing/2014/main" xmlns="" val="3823890681"/>
+                    <a16:rowId xmlns="" xmlns:a16="http://schemas.microsoft.com/office/drawing/2014/main" val="3823890681"/>
                   </a:ext>
                 </a:extLst>
               </a:tr>
@@ -7631,7 +7631,7 @@
                 </a:tc>
                 <a:extLst>
                   <a:ext uri="{0D108BD9-81ED-4DB2-BD59-A6C34878D82A}">
-                    <a16:rowId xmlns:a16="http://schemas.microsoft.com/office/drawing/2014/main" xmlns="" val="1367214614"/>
+                    <a16:rowId xmlns="" xmlns:a16="http://schemas.microsoft.com/office/drawing/2014/main" val="1367214614"/>
                   </a:ext>
                 </a:extLst>
               </a:tr>
@@ -7847,7 +7847,7 @@
                 </a:tc>
                 <a:extLst>
                   <a:ext uri="{0D108BD9-81ED-4DB2-BD59-A6C34878D82A}">
-                    <a16:rowId xmlns:a16="http://schemas.microsoft.com/office/drawing/2014/main" xmlns="" val="2251766736"/>
+                    <a16:rowId xmlns="" xmlns:a16="http://schemas.microsoft.com/office/drawing/2014/main" val="2251766736"/>
                   </a:ext>
                 </a:extLst>
               </a:tr>
@@ -8062,7 +8062,7 @@
                 </a:tc>
                 <a:extLst>
                   <a:ext uri="{0D108BD9-81ED-4DB2-BD59-A6C34878D82A}">
-                    <a16:rowId xmlns:a16="http://schemas.microsoft.com/office/drawing/2014/main" xmlns="" val="3479407592"/>
+                    <a16:rowId xmlns="" xmlns:a16="http://schemas.microsoft.com/office/drawing/2014/main" val="3479407592"/>
                   </a:ext>
                 </a:extLst>
               </a:tr>
@@ -8075,7 +8075,7 @@
           <p:cNvPr id="7" name="Geschweifte Klammer links 6">
             <a:extLst>
               <a:ext uri="{FF2B5EF4-FFF2-40B4-BE49-F238E27FC236}">
-                <a16:creationId xmlns:a16="http://schemas.microsoft.com/office/drawing/2014/main" xmlns="" id="{14C560D9-4A05-4FBF-BC4B-A2C2E630E210}"/>
+                <a16:creationId xmlns="" xmlns:a16="http://schemas.microsoft.com/office/drawing/2014/main" id="{14C560D9-4A05-4FBF-BC4B-A2C2E630E210}"/>
               </a:ext>
             </a:extLst>
           </p:cNvPr>
@@ -8119,7 +8119,7 @@
           <p:cNvPr id="9" name="Gerade Verbindung mit Pfeil 8">
             <a:extLst>
               <a:ext uri="{FF2B5EF4-FFF2-40B4-BE49-F238E27FC236}">
-                <a16:creationId xmlns:a16="http://schemas.microsoft.com/office/drawing/2014/main" xmlns="" id="{4D0DD315-02A7-4F76-8CB0-E4C120AE9221}"/>
+                <a16:creationId xmlns="" xmlns:a16="http://schemas.microsoft.com/office/drawing/2014/main" id="{4D0DD315-02A7-4F76-8CB0-E4C120AE9221}"/>
               </a:ext>
             </a:extLst>
           </p:cNvPr>
@@ -8160,7 +8160,7 @@
           <p:cNvPr id="12" name="Textfeld 11">
             <a:extLst>
               <a:ext uri="{FF2B5EF4-FFF2-40B4-BE49-F238E27FC236}">
-                <a16:creationId xmlns:a16="http://schemas.microsoft.com/office/drawing/2014/main" xmlns="" id="{C15FF49D-C2B0-40A6-A46E-2D45239A207D}"/>
+                <a16:creationId xmlns="" xmlns:a16="http://schemas.microsoft.com/office/drawing/2014/main" id="{C15FF49D-C2B0-40A6-A46E-2D45239A207D}"/>
               </a:ext>
             </a:extLst>
           </p:cNvPr>
@@ -8195,7 +8195,7 @@
           <p:cNvPr id="13" name="Textfeld 12">
             <a:extLst>
               <a:ext uri="{FF2B5EF4-FFF2-40B4-BE49-F238E27FC236}">
-                <a16:creationId xmlns:a16="http://schemas.microsoft.com/office/drawing/2014/main" xmlns="" id="{3FC29EA5-9AB3-45A8-8334-5826D8606D89}"/>
+                <a16:creationId xmlns="" xmlns:a16="http://schemas.microsoft.com/office/drawing/2014/main" id="{3FC29EA5-9AB3-45A8-8334-5826D8606D89}"/>
               </a:ext>
             </a:extLst>
           </p:cNvPr>
@@ -8242,7 +8242,7 @@
           <p:cNvPr id="14" name="Textfeld 13">
             <a:extLst>
               <a:ext uri="{FF2B5EF4-FFF2-40B4-BE49-F238E27FC236}">
-                <a16:creationId xmlns:a16="http://schemas.microsoft.com/office/drawing/2014/main" xmlns="" id="{01BEDF11-9F21-4506-9A35-6E547DFD6ED9}"/>
+                <a16:creationId xmlns="" xmlns:a16="http://schemas.microsoft.com/office/drawing/2014/main" id="{01BEDF11-9F21-4506-9A35-6E547DFD6ED9}"/>
               </a:ext>
             </a:extLst>
           </p:cNvPr>
@@ -8277,7 +8277,7 @@
           <p:cNvPr id="15" name="Textfeld 14">
             <a:extLst>
               <a:ext uri="{FF2B5EF4-FFF2-40B4-BE49-F238E27FC236}">
-                <a16:creationId xmlns:a16="http://schemas.microsoft.com/office/drawing/2014/main" xmlns="" id="{0BE8ACF3-BF2B-4E16-9AAF-9A532B14145B}"/>
+                <a16:creationId xmlns="" xmlns:a16="http://schemas.microsoft.com/office/drawing/2014/main" id="{0BE8ACF3-BF2B-4E16-9AAF-9A532B14145B}"/>
               </a:ext>
             </a:extLst>
           </p:cNvPr>
@@ -8312,7 +8312,7 @@
           <p:cNvPr id="16" name="Textfeld 15">
             <a:extLst>
               <a:ext uri="{FF2B5EF4-FFF2-40B4-BE49-F238E27FC236}">
-                <a16:creationId xmlns:a16="http://schemas.microsoft.com/office/drawing/2014/main" xmlns="" id="{52C667EA-3FDE-4930-B3BF-5C3AB267C9CC}"/>
+                <a16:creationId xmlns="" xmlns:a16="http://schemas.microsoft.com/office/drawing/2014/main" id="{52C667EA-3FDE-4930-B3BF-5C3AB267C9CC}"/>
               </a:ext>
             </a:extLst>
           </p:cNvPr>
@@ -8347,7 +8347,7 @@
           <p:cNvPr id="18" name="Grafik 17">
             <a:extLst>
               <a:ext uri="{FF2B5EF4-FFF2-40B4-BE49-F238E27FC236}">
-                <a16:creationId xmlns:a16="http://schemas.microsoft.com/office/drawing/2014/main" xmlns="" id="{BD01557F-B7E2-46C8-B4CD-FCC196BBD008}"/>
+                <a16:creationId xmlns="" xmlns:a16="http://schemas.microsoft.com/office/drawing/2014/main" id="{BD01557F-B7E2-46C8-B4CD-FCC196BBD008}"/>
               </a:ext>
             </a:extLst>
           </p:cNvPr>
@@ -8377,7 +8377,7 @@
           <p:cNvPr id="19" name="Grafik 18">
             <a:extLst>
               <a:ext uri="{FF2B5EF4-FFF2-40B4-BE49-F238E27FC236}">
-                <a16:creationId xmlns:a16="http://schemas.microsoft.com/office/drawing/2014/main" xmlns="" id="{10AC13AB-9589-4791-BE45-5FF25801AAC6}"/>
+                <a16:creationId xmlns="" xmlns:a16="http://schemas.microsoft.com/office/drawing/2014/main" id="{10AC13AB-9589-4791-BE45-5FF25801AAC6}"/>
               </a:ext>
             </a:extLst>
           </p:cNvPr>

</xml_diff>